<commit_message>
Add updated doc and ppt
</commit_message>
<xml_diff>
--- a/documentation/Project Powerpoint.pptx
+++ b/documentation/Project Powerpoint.pptx
@@ -1103,7 +1103,7 @@
   <p:cSld>
     <p:spTree>
       <p:nvGrpSpPr>
-        <p:cNvPr id="80" name="Shape 80"/>
+        <p:cNvPr id="81" name="Shape 81"/>
         <p:cNvGrpSpPr/>
         <p:nvPr/>
       </p:nvGrpSpPr>
@@ -1117,7 +1117,7 @@
       </p:grpSpPr>
       <p:sp>
         <p:nvSpPr>
-          <p:cNvPr id="81" name="Google Shape;81;g106eae75579_0_115:notes"/>
+          <p:cNvPr id="82" name="Google Shape;82;g106eae75579_0_115:notes"/>
           <p:cNvSpPr/>
           <p:nvPr>
             <p:ph idx="2" type="sldImg"/>
@@ -1152,7 +1152,7 @@
       </p:sp>
       <p:sp>
         <p:nvSpPr>
-          <p:cNvPr id="82" name="Google Shape;82;g106eae75579_0_115:notes"/>
+          <p:cNvPr id="83" name="Google Shape;83;g106eae75579_0_115:notes"/>
           <p:cNvSpPr txBox="1"/>
           <p:nvPr>
             <p:ph idx="1" type="body"/>
@@ -1202,7 +1202,7 @@
   <p:cSld>
     <p:spTree>
       <p:nvGrpSpPr>
-        <p:cNvPr id="86" name="Shape 86"/>
+        <p:cNvPr id="88" name="Shape 88"/>
         <p:cNvGrpSpPr/>
         <p:nvPr/>
       </p:nvGrpSpPr>
@@ -1216,7 +1216,7 @@
       </p:grpSpPr>
       <p:sp>
         <p:nvSpPr>
-          <p:cNvPr id="87" name="Google Shape;87;g106eae75579_0_120:notes"/>
+          <p:cNvPr id="89" name="Google Shape;89;g106eae75579_0_120:notes"/>
           <p:cNvSpPr/>
           <p:nvPr>
             <p:ph idx="2" type="sldImg"/>
@@ -1251,7 +1251,7 @@
       </p:sp>
       <p:sp>
         <p:nvSpPr>
-          <p:cNvPr id="88" name="Google Shape;88;g106eae75579_0_120:notes"/>
+          <p:cNvPr id="90" name="Google Shape;90;g106eae75579_0_120:notes"/>
           <p:cNvSpPr txBox="1"/>
           <p:nvPr>
             <p:ph idx="1" type="body"/>
@@ -7024,7 +7024,7 @@
         </p:spPr>
         <p:txBody>
           <a:bodyPr anchorCtr="0" anchor="t" bIns="91425" lIns="91425" spcFirstLastPara="1" rIns="91425" wrap="square" tIns="91425">
-            <a:normAutofit lnSpcReduction="20000"/>
+            <a:normAutofit/>
           </a:bodyPr>
           <a:lstStyle/>
           <a:p>
@@ -7043,7 +7043,7 @@
             </a:pPr>
             <a:r>
               <a:rPr lang="en" sz="2000"/>
-              <a:t>KMeans</a:t>
+              <a:t>Preprocessing &amp; Visualization</a:t>
             </a:r>
             <a:endParaRPr sz="2000"/>
           </a:p>
@@ -7063,7 +7063,27 @@
             </a:pPr>
             <a:r>
               <a:rPr lang="en" sz="2000"/>
-              <a:t>Classification Models:</a:t>
+              <a:t>Feature Importance using Gini Score</a:t>
+            </a:r>
+            <a:endParaRPr sz="2000"/>
+          </a:p>
+          <a:p>
+            <a:pPr indent="-355600" lvl="0" marL="457200" rtl="0" algn="l">
+              <a:lnSpc>
+                <a:spcPct val="150000"/>
+              </a:lnSpc>
+              <a:spcBef>
+                <a:spcPts val="0"/>
+              </a:spcBef>
+              <a:spcAft>
+                <a:spcPts val="0"/>
+              </a:spcAft>
+              <a:buSzPts val="2000"/>
+              <a:buChar char="●"/>
+            </a:pPr>
+            <a:r>
+              <a:rPr lang="en" sz="2000"/>
+              <a:t>KMeans Clustering</a:t>
             </a:r>
             <a:endParaRPr sz="2000"/>
           </a:p>
@@ -7083,47 +7103,7 @@
             </a:pPr>
             <a:r>
               <a:rPr lang="en" sz="2000"/>
-              <a:t>Nearest Neighbors</a:t>
-            </a:r>
-            <a:endParaRPr sz="2000"/>
-          </a:p>
-          <a:p>
-            <a:pPr indent="-355600" lvl="1" marL="914400" rtl="0" algn="l">
-              <a:lnSpc>
-                <a:spcPct val="150000"/>
-              </a:lnSpc>
-              <a:spcBef>
-                <a:spcPts val="0"/>
-              </a:spcBef>
-              <a:spcAft>
-                <a:spcPts val="0"/>
-              </a:spcAft>
-              <a:buSzPts val="2000"/>
-              <a:buChar char="○"/>
-            </a:pPr>
-            <a:r>
-              <a:rPr lang="en" sz="2000"/>
-              <a:t>Decision Tree</a:t>
-            </a:r>
-            <a:endParaRPr sz="2000"/>
-          </a:p>
-          <a:p>
-            <a:pPr indent="-355600" lvl="1" marL="914400" rtl="0" algn="l">
-              <a:lnSpc>
-                <a:spcPct val="150000"/>
-              </a:lnSpc>
-              <a:spcBef>
-                <a:spcPts val="0"/>
-              </a:spcBef>
-              <a:spcAft>
-                <a:spcPts val="0"/>
-              </a:spcAft>
-              <a:buSzPts val="2000"/>
-              <a:buChar char="○"/>
-            </a:pPr>
-            <a:r>
-              <a:rPr lang="en" sz="2000"/>
-              <a:t>Random Forrest</a:t>
+              <a:t>Finding the Golden Cluster</a:t>
             </a:r>
             <a:endParaRPr sz="2000"/>
           </a:p>
@@ -7163,7 +7143,7 @@
             </a:pPr>
             <a:r>
               <a:rPr lang="en" sz="2000"/>
-              <a:t>Random Forrest</a:t>
+              <a:t>Random Forest Regression</a:t>
             </a:r>
             <a:endParaRPr sz="2000"/>
           </a:p>
@@ -7187,6 +7167,33 @@
           </a:p>
         </p:txBody>
       </p:sp>
+      <p:pic>
+        <p:nvPicPr>
+          <p:cNvPr id="80" name="Google Shape;80;p16"/>
+          <p:cNvPicPr preferRelativeResize="0"/>
+          <p:nvPr/>
+        </p:nvPicPr>
+        <p:blipFill rotWithShape="1">
+          <a:blip r:embed="rId3">
+            <a:alphaModFix/>
+          </a:blip>
+          <a:srcRect b="690" l="8236" r="12335" t="680"/>
+          <a:stretch/>
+        </p:blipFill>
+        <p:spPr>
+          <a:xfrm>
+            <a:off x="4991825" y="1152475"/>
+            <a:ext cx="3840474" cy="3090874"/>
+          </a:xfrm>
+          <a:prstGeom prst="rect">
+            <a:avLst/>
+          </a:prstGeom>
+          <a:noFill/>
+          <a:ln>
+            <a:noFill/>
+          </a:ln>
+        </p:spPr>
+      </p:pic>
     </p:spTree>
   </p:cSld>
   <p:clrMapOvr>
@@ -7200,7 +7207,7 @@
   <p:cSld>
     <p:spTree>
       <p:nvGrpSpPr>
-        <p:cNvPr id="83" name="Shape 83"/>
+        <p:cNvPr id="84" name="Shape 84"/>
         <p:cNvGrpSpPr/>
         <p:nvPr/>
       </p:nvGrpSpPr>
@@ -7214,7 +7221,7 @@
       </p:grpSpPr>
       <p:sp>
         <p:nvSpPr>
-          <p:cNvPr id="84" name="Google Shape;84;p17"/>
+          <p:cNvPr id="85" name="Google Shape;85;p17"/>
           <p:cNvSpPr txBox="1"/>
           <p:nvPr>
             <p:ph type="title"/>
@@ -7252,45 +7259,62 @@
           </a:p>
         </p:txBody>
       </p:sp>
-      <p:sp>
-        <p:nvSpPr>
-          <p:cNvPr id="85" name="Google Shape;85;p17"/>
-          <p:cNvSpPr txBox="1"/>
-          <p:nvPr>
-            <p:ph idx="1" type="body"/>
-          </p:nvPr>
-        </p:nvSpPr>
+      <p:pic>
+        <p:nvPicPr>
+          <p:cNvPr id="86" name="Google Shape;86;p17"/>
+          <p:cNvPicPr preferRelativeResize="0"/>
+          <p:nvPr/>
+        </p:nvPicPr>
+        <p:blipFill>
+          <a:blip r:embed="rId3">
+            <a:alphaModFix/>
+          </a:blip>
+          <a:stretch>
+            <a:fillRect/>
+          </a:stretch>
+        </p:blipFill>
         <p:spPr>
           <a:xfrm>
-            <a:off x="311700" y="1152475"/>
-            <a:ext cx="8520600" cy="3416400"/>
+            <a:off x="311700" y="1017725"/>
+            <a:ext cx="4239284" cy="3820975"/>
           </a:xfrm>
           <a:prstGeom prst="rect">
             <a:avLst/>
           </a:prstGeom>
+          <a:noFill/>
+          <a:ln>
+            <a:noFill/>
+          </a:ln>
         </p:spPr>
-        <p:txBody>
-          <a:bodyPr anchorCtr="0" anchor="t" bIns="91425" lIns="91425" spcFirstLastPara="1" rIns="91425" wrap="square" tIns="91425">
-            <a:normAutofit/>
-          </a:bodyPr>
-          <a:lstStyle/>
-          <a:p>
-            <a:pPr indent="0" lvl="0" marL="0" rtl="0" algn="l">
-              <a:spcBef>
-                <a:spcPts val="0"/>
-              </a:spcBef>
-              <a:spcAft>
-                <a:spcPts val="1200"/>
-              </a:spcAft>
-              <a:buNone/>
-            </a:pPr>
-            <a:r>
-              <a:t/>
-            </a:r>
-            <a:endParaRPr/>
-          </a:p>
-        </p:txBody>
-      </p:sp>
+      </p:pic>
+      <p:pic>
+        <p:nvPicPr>
+          <p:cNvPr id="87" name="Google Shape;87;p17"/>
+          <p:cNvPicPr preferRelativeResize="0"/>
+          <p:nvPr/>
+        </p:nvPicPr>
+        <p:blipFill>
+          <a:blip r:embed="rId4">
+            <a:alphaModFix/>
+          </a:blip>
+          <a:stretch>
+            <a:fillRect/>
+          </a:stretch>
+        </p:blipFill>
+        <p:spPr>
+          <a:xfrm>
+            <a:off x="5758209" y="1017725"/>
+            <a:ext cx="2510292" cy="3820975"/>
+          </a:xfrm>
+          <a:prstGeom prst="rect">
+            <a:avLst/>
+          </a:prstGeom>
+          <a:noFill/>
+          <a:ln>
+            <a:noFill/>
+          </a:ln>
+        </p:spPr>
+      </p:pic>
     </p:spTree>
   </p:cSld>
   <p:clrMapOvr>
@@ -7304,7 +7328,7 @@
   <p:cSld>
     <p:spTree>
       <p:nvGrpSpPr>
-        <p:cNvPr id="89" name="Shape 89"/>
+        <p:cNvPr id="91" name="Shape 91"/>
         <p:cNvGrpSpPr/>
         <p:nvPr/>
       </p:nvGrpSpPr>
@@ -7318,7 +7342,7 @@
       </p:grpSpPr>
       <p:sp>
         <p:nvSpPr>
-          <p:cNvPr id="90" name="Google Shape;90;p18"/>
+          <p:cNvPr id="92" name="Google Shape;92;p18"/>
           <p:cNvSpPr txBox="1"/>
           <p:nvPr>
             <p:ph type="title"/>
@@ -7350,7 +7374,7 @@
             </a:pPr>
             <a:r>
               <a:rPr lang="en"/>
-              <a:t>Conclusion</a:t>
+              <a:t>Deployment</a:t>
             </a:r>
             <a:endParaRPr/>
           </a:p>
@@ -7358,7 +7382,7 @@
       </p:sp>
       <p:sp>
         <p:nvSpPr>
-          <p:cNvPr id="91" name="Google Shape;91;p18"/>
+          <p:cNvPr id="93" name="Google Shape;93;p18"/>
           <p:cNvSpPr txBox="1"/>
           <p:nvPr>
             <p:ph idx="1" type="body"/>

</xml_diff>

<commit_message>
Add new doc & complete
</commit_message>
<xml_diff>
--- a/documentation/Project Powerpoint.pptx
+++ b/documentation/Project Powerpoint.pptx
@@ -7380,45 +7380,34 @@
           </a:p>
         </p:txBody>
       </p:sp>
-      <p:sp>
-        <p:nvSpPr>
+      <p:pic>
+        <p:nvPicPr>
           <p:cNvPr id="93" name="Google Shape;93;p18"/>
-          <p:cNvSpPr txBox="1"/>
-          <p:nvPr>
-            <p:ph idx="1" type="body"/>
-          </p:nvPr>
-        </p:nvSpPr>
+          <p:cNvPicPr preferRelativeResize="0"/>
+          <p:nvPr/>
+        </p:nvPicPr>
+        <p:blipFill>
+          <a:blip r:embed="rId3">
+            <a:alphaModFix/>
+          </a:blip>
+          <a:stretch>
+            <a:fillRect/>
+          </a:stretch>
+        </p:blipFill>
         <p:spPr>
           <a:xfrm>
-            <a:off x="311700" y="1152475"/>
-            <a:ext cx="8520600" cy="3416400"/>
+            <a:off x="638175" y="1017725"/>
+            <a:ext cx="7698739" cy="3820976"/>
           </a:xfrm>
           <a:prstGeom prst="rect">
             <a:avLst/>
           </a:prstGeom>
+          <a:noFill/>
+          <a:ln>
+            <a:noFill/>
+          </a:ln>
         </p:spPr>
-        <p:txBody>
-          <a:bodyPr anchorCtr="0" anchor="t" bIns="91425" lIns="91425" spcFirstLastPara="1" rIns="91425" wrap="square" tIns="91425">
-            <a:normAutofit/>
-          </a:bodyPr>
-          <a:lstStyle/>
-          <a:p>
-            <a:pPr indent="0" lvl="0" marL="0" rtl="0" algn="l">
-              <a:spcBef>
-                <a:spcPts val="0"/>
-              </a:spcBef>
-              <a:spcAft>
-                <a:spcPts val="1200"/>
-              </a:spcAft>
-              <a:buNone/>
-            </a:pPr>
-            <a:r>
-              <a:t/>
-            </a:r>
-            <a:endParaRPr/>
-          </a:p>
-        </p:txBody>
-      </p:sp>
+      </p:pic>
     </p:spTree>
   </p:cSld>
   <p:clrMapOvr>

</xml_diff>

<commit_message>
Add newest version of powerpoint
</commit_message>
<xml_diff>
--- a/documentation/Project Powerpoint.pptx
+++ b/documentation/Project Powerpoint.pptx
@@ -14,18 +14,20 @@
     <p:sldId id="259" r:id="rId9"/>
     <p:sldId id="260" r:id="rId10"/>
     <p:sldId id="261" r:id="rId11"/>
+    <p:sldId id="262" r:id="rId12"/>
+    <p:sldId id="263" r:id="rId13"/>
   </p:sldIdLst>
   <p:sldSz cy="5143500" cx="9144000"/>
   <p:notesSz cx="6858000" cy="9144000"/>
   <p:embeddedFontLst>
     <p:embeddedFont>
       <p:font typeface="Average"/>
-      <p:regular r:id="rId12"/>
+      <p:regular r:id="rId14"/>
     </p:embeddedFont>
     <p:embeddedFont>
       <p:font typeface="Oswald"/>
-      <p:regular r:id="rId13"/>
-      <p:bold r:id="rId14"/>
+      <p:regular r:id="rId15"/>
+      <p:bold r:id="rId16"/>
     </p:embeddedFont>
   </p:embeddedFontLst>
   <p:defaultTextStyle>
@@ -820,7 +822,7 @@
       </p:grpSpPr>
       <p:sp>
         <p:nvSpPr>
-          <p:cNvPr id="62" name="Google Shape;62;g106eae75579_0_95:notes"/>
+          <p:cNvPr id="62" name="Google Shape;62;g106eae75579_0_196:notes"/>
           <p:cNvSpPr/>
           <p:nvPr>
             <p:ph idx="2" type="sldImg"/>
@@ -855,7 +857,7 @@
       </p:sp>
       <p:sp>
         <p:nvSpPr>
-          <p:cNvPr id="63" name="Google Shape;63;g106eae75579_0_95:notes"/>
+          <p:cNvPr id="63" name="Google Shape;63;g106eae75579_0_196:notes"/>
           <p:cNvSpPr txBox="1"/>
           <p:nvPr>
             <p:ph idx="1" type="body"/>
@@ -919,7 +921,7 @@
       </p:grpSpPr>
       <p:sp>
         <p:nvSpPr>
-          <p:cNvPr id="68" name="Google Shape;68;g106eae75579_0_100:notes"/>
+          <p:cNvPr id="68" name="Google Shape;68;g106eae75579_0_185:notes"/>
           <p:cNvSpPr/>
           <p:nvPr>
             <p:ph idx="2" type="sldImg"/>
@@ -954,7 +956,7 @@
       </p:sp>
       <p:sp>
         <p:nvSpPr>
-          <p:cNvPr id="69" name="Google Shape;69;g106eae75579_0_100:notes"/>
+          <p:cNvPr id="69" name="Google Shape;69;g106eae75579_0_185:notes"/>
           <p:cNvSpPr txBox="1"/>
           <p:nvPr>
             <p:ph idx="1" type="body"/>
@@ -1004,7 +1006,7 @@
   <p:cSld>
     <p:spTree>
       <p:nvGrpSpPr>
-        <p:cNvPr id="74" name="Shape 74"/>
+        <p:cNvPr id="73" name="Shape 73"/>
         <p:cNvGrpSpPr/>
         <p:nvPr/>
       </p:nvGrpSpPr>
@@ -1018,7 +1020,7 @@
       </p:grpSpPr>
       <p:sp>
         <p:nvSpPr>
-          <p:cNvPr id="75" name="Google Shape;75;g106eae75579_0_105:notes"/>
+          <p:cNvPr id="74" name="Google Shape;74;g106eae75579_0_202:notes"/>
           <p:cNvSpPr/>
           <p:nvPr>
             <p:ph idx="2" type="sldImg"/>
@@ -1053,7 +1055,7 @@
       </p:sp>
       <p:sp>
         <p:nvSpPr>
-          <p:cNvPr id="76" name="Google Shape;76;g106eae75579_0_105:notes"/>
+          <p:cNvPr id="75" name="Google Shape;75;g106eae75579_0_202:notes"/>
           <p:cNvSpPr txBox="1"/>
           <p:nvPr>
             <p:ph idx="1" type="body"/>
@@ -1103,7 +1105,7 @@
   <p:cSld>
     <p:spTree>
       <p:nvGrpSpPr>
-        <p:cNvPr id="81" name="Shape 81"/>
+        <p:cNvPr id="79" name="Shape 79"/>
         <p:cNvGrpSpPr/>
         <p:nvPr/>
       </p:nvGrpSpPr>
@@ -1117,7 +1119,7 @@
       </p:grpSpPr>
       <p:sp>
         <p:nvSpPr>
-          <p:cNvPr id="82" name="Google Shape;82;g106eae75579_0_115:notes"/>
+          <p:cNvPr id="80" name="Google Shape;80;g106eae75579_0_100:notes"/>
           <p:cNvSpPr/>
           <p:nvPr>
             <p:ph idx="2" type="sldImg"/>
@@ -1152,7 +1154,7 @@
       </p:sp>
       <p:sp>
         <p:nvSpPr>
-          <p:cNvPr id="83" name="Google Shape;83;g106eae75579_0_115:notes"/>
+          <p:cNvPr id="81" name="Google Shape;81;g106eae75579_0_100:notes"/>
           <p:cNvSpPr txBox="1"/>
           <p:nvPr>
             <p:ph idx="1" type="body"/>
@@ -1202,7 +1204,7 @@
   <p:cSld>
     <p:spTree>
       <p:nvGrpSpPr>
-        <p:cNvPr id="88" name="Shape 88"/>
+        <p:cNvPr id="86" name="Shape 86"/>
         <p:cNvGrpSpPr/>
         <p:nvPr/>
       </p:nvGrpSpPr>
@@ -1216,7 +1218,7 @@
       </p:grpSpPr>
       <p:sp>
         <p:nvSpPr>
-          <p:cNvPr id="89" name="Google Shape;89;g106eae75579_0_120:notes"/>
+          <p:cNvPr id="87" name="Google Shape;87;g106eae75579_0_105:notes"/>
           <p:cNvSpPr/>
           <p:nvPr>
             <p:ph idx="2" type="sldImg"/>
@@ -1251,7 +1253,205 @@
       </p:sp>
       <p:sp>
         <p:nvSpPr>
-          <p:cNvPr id="90" name="Google Shape;90;g106eae75579_0_120:notes"/>
+          <p:cNvPr id="88" name="Google Shape;88;g106eae75579_0_105:notes"/>
+          <p:cNvSpPr txBox="1"/>
+          <p:nvPr>
+            <p:ph idx="1" type="body"/>
+          </p:nvPr>
+        </p:nvSpPr>
+        <p:spPr>
+          <a:xfrm>
+            <a:off x="685800" y="4343400"/>
+            <a:ext cx="5486400" cy="4114800"/>
+          </a:xfrm>
+          <a:prstGeom prst="rect">
+            <a:avLst/>
+          </a:prstGeom>
+        </p:spPr>
+        <p:txBody>
+          <a:bodyPr anchorCtr="0" anchor="t" bIns="91425" lIns="91425" spcFirstLastPara="1" rIns="91425" wrap="square" tIns="91425">
+            <a:noAutofit/>
+          </a:bodyPr>
+          <a:lstStyle/>
+          <a:p>
+            <a:pPr indent="0" lvl="0" marL="0" rtl="0" algn="l">
+              <a:spcBef>
+                <a:spcPts val="0"/>
+              </a:spcBef>
+              <a:spcAft>
+                <a:spcPts val="0"/>
+              </a:spcAft>
+              <a:buNone/>
+            </a:pPr>
+            <a:r>
+              <a:t/>
+            </a:r>
+            <a:endParaRPr/>
+          </a:p>
+        </p:txBody>
+      </p:sp>
+    </p:spTree>
+  </p:cSld>
+  <p:clrMapOvr>
+    <a:masterClrMapping/>
+  </p:clrMapOvr>
+</p:notes>
+</file>
+
+<file path=ppt/notesSlides/notesSlide7.xml><?xml version="1.0" encoding="utf-8"?>
+<p:notes xmlns:a="http://schemas.openxmlformats.org/drawingml/2006/main" xmlns:r="http://schemas.openxmlformats.org/officeDocument/2006/relationships" xmlns:mc="http://schemas.openxmlformats.org/markup-compatibility/2006" xmlns:mv="urn:schemas-microsoft-com:mac:vml" xmlns:p="http://schemas.openxmlformats.org/presentationml/2006/main" xmlns:c="http://schemas.openxmlformats.org/drawingml/2006/chart" xmlns:dgm="http://schemas.openxmlformats.org/drawingml/2006/diagram" xmlns:o="urn:schemas-microsoft-com:office:office" xmlns:v="urn:schemas-microsoft-com:vml" xmlns:pvml="urn:schemas-microsoft-com:office:powerpoint" xmlns:com="http://schemas.openxmlformats.org/drawingml/2006/compatibility" xmlns:p14="http://schemas.microsoft.com/office/powerpoint/2010/main" xmlns:p15="http://schemas.microsoft.com/office/powerpoint/2012/main" xmlns:ahyp="http://schemas.microsoft.com/office/drawing/2018/hyperlinkcolor" showMasterPhAnim="0" showMasterSp="0">
+  <p:cSld>
+    <p:spTree>
+      <p:nvGrpSpPr>
+        <p:cNvPr id="93" name="Shape 93"/>
+        <p:cNvGrpSpPr/>
+        <p:nvPr/>
+      </p:nvGrpSpPr>
+      <p:grpSpPr>
+        <a:xfrm>
+          <a:off x="0" y="0"/>
+          <a:ext cx="0" cy="0"/>
+          <a:chOff x="0" y="0"/>
+          <a:chExt cx="0" cy="0"/>
+        </a:xfrm>
+      </p:grpSpPr>
+      <p:sp>
+        <p:nvSpPr>
+          <p:cNvPr id="94" name="Google Shape;94;g106eae75579_0_115:notes"/>
+          <p:cNvSpPr/>
+          <p:nvPr>
+            <p:ph idx="2" type="sldImg"/>
+          </p:nvPr>
+        </p:nvSpPr>
+        <p:spPr>
+          <a:xfrm>
+            <a:off x="381300" y="685800"/>
+            <a:ext cx="6096000" cy="3429000"/>
+          </a:xfrm>
+          <a:custGeom>
+            <a:rect b="b" l="l" r="r" t="t"/>
+            <a:pathLst>
+              <a:path extrusionOk="0" h="120000" w="120000">
+                <a:moveTo>
+                  <a:pt x="0" y="0"/>
+                </a:moveTo>
+                <a:lnTo>
+                  <a:pt x="120000" y="0"/>
+                </a:lnTo>
+                <a:lnTo>
+                  <a:pt x="120000" y="120000"/>
+                </a:lnTo>
+                <a:lnTo>
+                  <a:pt x="0" y="120000"/>
+                </a:lnTo>
+                <a:close/>
+              </a:path>
+            </a:pathLst>
+          </a:custGeom>
+        </p:spPr>
+      </p:sp>
+      <p:sp>
+        <p:nvSpPr>
+          <p:cNvPr id="95" name="Google Shape;95;g106eae75579_0_115:notes"/>
+          <p:cNvSpPr txBox="1"/>
+          <p:nvPr>
+            <p:ph idx="1" type="body"/>
+          </p:nvPr>
+        </p:nvSpPr>
+        <p:spPr>
+          <a:xfrm>
+            <a:off x="685800" y="4343400"/>
+            <a:ext cx="5486400" cy="4114800"/>
+          </a:xfrm>
+          <a:prstGeom prst="rect">
+            <a:avLst/>
+          </a:prstGeom>
+        </p:spPr>
+        <p:txBody>
+          <a:bodyPr anchorCtr="0" anchor="t" bIns="91425" lIns="91425" spcFirstLastPara="1" rIns="91425" wrap="square" tIns="91425">
+            <a:noAutofit/>
+          </a:bodyPr>
+          <a:lstStyle/>
+          <a:p>
+            <a:pPr indent="0" lvl="0" marL="0" rtl="0" algn="l">
+              <a:spcBef>
+                <a:spcPts val="0"/>
+              </a:spcBef>
+              <a:spcAft>
+                <a:spcPts val="0"/>
+              </a:spcAft>
+              <a:buNone/>
+            </a:pPr>
+            <a:r>
+              <a:t/>
+            </a:r>
+            <a:endParaRPr/>
+          </a:p>
+        </p:txBody>
+      </p:sp>
+    </p:spTree>
+  </p:cSld>
+  <p:clrMapOvr>
+    <a:masterClrMapping/>
+  </p:clrMapOvr>
+</p:notes>
+</file>
+
+<file path=ppt/notesSlides/notesSlide8.xml><?xml version="1.0" encoding="utf-8"?>
+<p:notes xmlns:a="http://schemas.openxmlformats.org/drawingml/2006/main" xmlns:r="http://schemas.openxmlformats.org/officeDocument/2006/relationships" xmlns:mc="http://schemas.openxmlformats.org/markup-compatibility/2006" xmlns:mv="urn:schemas-microsoft-com:mac:vml" xmlns:p="http://schemas.openxmlformats.org/presentationml/2006/main" xmlns:c="http://schemas.openxmlformats.org/drawingml/2006/chart" xmlns:dgm="http://schemas.openxmlformats.org/drawingml/2006/diagram" xmlns:o="urn:schemas-microsoft-com:office:office" xmlns:v="urn:schemas-microsoft-com:vml" xmlns:pvml="urn:schemas-microsoft-com:office:powerpoint" xmlns:com="http://schemas.openxmlformats.org/drawingml/2006/compatibility" xmlns:p14="http://schemas.microsoft.com/office/powerpoint/2010/main" xmlns:p15="http://schemas.microsoft.com/office/powerpoint/2012/main" xmlns:ahyp="http://schemas.microsoft.com/office/drawing/2018/hyperlinkcolor" showMasterPhAnim="0" showMasterSp="0">
+  <p:cSld>
+    <p:spTree>
+      <p:nvGrpSpPr>
+        <p:cNvPr id="100" name="Shape 100"/>
+        <p:cNvGrpSpPr/>
+        <p:nvPr/>
+      </p:nvGrpSpPr>
+      <p:grpSpPr>
+        <a:xfrm>
+          <a:off x="0" y="0"/>
+          <a:ext cx="0" cy="0"/>
+          <a:chOff x="0" y="0"/>
+          <a:chExt cx="0" cy="0"/>
+        </a:xfrm>
+      </p:grpSpPr>
+      <p:sp>
+        <p:nvSpPr>
+          <p:cNvPr id="101" name="Google Shape;101;g106eae75579_0_120:notes"/>
+          <p:cNvSpPr/>
+          <p:nvPr>
+            <p:ph idx="2" type="sldImg"/>
+          </p:nvPr>
+        </p:nvSpPr>
+        <p:spPr>
+          <a:xfrm>
+            <a:off x="381300" y="685800"/>
+            <a:ext cx="6096000" cy="3429000"/>
+          </a:xfrm>
+          <a:custGeom>
+            <a:rect b="b" l="l" r="r" t="t"/>
+            <a:pathLst>
+              <a:path extrusionOk="0" h="120000" w="120000">
+                <a:moveTo>
+                  <a:pt x="0" y="0"/>
+                </a:moveTo>
+                <a:lnTo>
+                  <a:pt x="120000" y="0"/>
+                </a:lnTo>
+                <a:lnTo>
+                  <a:pt x="120000" y="120000"/>
+                </a:lnTo>
+                <a:lnTo>
+                  <a:pt x="0" y="120000"/>
+                </a:lnTo>
+                <a:close/>
+              </a:path>
+            </a:pathLst>
+          </a:custGeom>
+        </p:spPr>
+      </p:sp>
+      <p:sp>
+        <p:nvSpPr>
+          <p:cNvPr id="102" name="Google Shape;102;g106eae75579_0_120:notes"/>
           <p:cNvSpPr txBox="1"/>
           <p:nvPr>
             <p:ph idx="1" type="body"/>
@@ -6693,7 +6893,7 @@
             </a:pPr>
             <a:r>
               <a:rPr lang="en"/>
-              <a:t>Introduction &amp; Business Understanding</a:t>
+              <a:t>CRISP-DM</a:t>
             </a:r>
             <a:endParaRPr/>
           </a:p>
@@ -6718,14 +6918,11 @@
         </p:spPr>
         <p:txBody>
           <a:bodyPr anchorCtr="0" anchor="t" bIns="91425" lIns="91425" spcFirstLastPara="1" rIns="91425" wrap="square" tIns="91425">
-            <a:normAutofit/>
+            <a:noAutofit/>
           </a:bodyPr>
           <a:lstStyle/>
           <a:p>
             <a:pPr indent="-355600" lvl="0" marL="457200" rtl="0" algn="l">
-              <a:lnSpc>
-                <a:spcPct val="150000"/>
-              </a:lnSpc>
               <a:spcBef>
                 <a:spcPts val="0"/>
               </a:spcBef>
@@ -6737,15 +6934,29 @@
             </a:pPr>
             <a:r>
               <a:rPr lang="en" sz="2000"/>
-              <a:t>Car Purchases are significant ordeals for customers</a:t>
+              <a:t>Business Understanding   </a:t>
+            </a:r>
+            <a:endParaRPr sz="2000"/>
+          </a:p>
+          <a:p>
+            <a:pPr indent="-355600" lvl="1" marL="914400" rtl="0" algn="l">
+              <a:spcBef>
+                <a:spcPts val="0"/>
+              </a:spcBef>
+              <a:spcAft>
+                <a:spcPts val="0"/>
+              </a:spcAft>
+              <a:buSzPts val="2000"/>
+              <a:buChar char="○"/>
+            </a:pPr>
+            <a:r>
+              <a:rPr lang="en" sz="2000"/>
+              <a:t>Provide potential customers with a better understanding of the value of their car &amp; purchase price</a:t>
             </a:r>
             <a:endParaRPr sz="2000"/>
           </a:p>
           <a:p>
             <a:pPr indent="-355600" lvl="0" marL="457200" rtl="0" algn="l">
-              <a:lnSpc>
-                <a:spcPct val="150000"/>
-              </a:lnSpc>
               <a:spcBef>
                 <a:spcPts val="0"/>
               </a:spcBef>
@@ -6757,15 +6968,12 @@
             </a:pPr>
             <a:r>
               <a:rPr lang="en" sz="2000"/>
-              <a:t>Machine Learning helps provide knowledge to potential customers for best value purchases</a:t>
+              <a:t>Data Understanding </a:t>
             </a:r>
             <a:endParaRPr sz="2000"/>
           </a:p>
           <a:p>
-            <a:pPr indent="-355600" lvl="0" marL="457200" rtl="0" algn="l">
-              <a:lnSpc>
-                <a:spcPct val="150000"/>
-              </a:lnSpc>
+            <a:pPr indent="-355600" lvl="1" marL="914400" rtl="0" algn="l">
               <a:spcBef>
                 <a:spcPts val="0"/>
               </a:spcBef>
@@ -6773,11 +6981,49 @@
                 <a:spcPts val="0"/>
               </a:spcAft>
               <a:buSzPts val="2000"/>
-              <a:buChar char="●"/>
+              <a:buChar char="○"/>
             </a:pPr>
             <a:r>
               <a:rPr lang="en" sz="2000"/>
-              <a:t>Uses variables such as car model, age, price, depreciation to get price prediction</a:t>
+              <a:t>Scraped data from TrueCar</a:t>
+            </a:r>
+            <a:r>
+              <a:rPr lang="en" sz="2000"/>
+              <a:t>s</a:t>
+            </a:r>
+            <a:endParaRPr sz="2000"/>
+          </a:p>
+          <a:p>
+            <a:pPr indent="-355600" lvl="1" marL="914400" rtl="0" algn="l">
+              <a:spcBef>
+                <a:spcPts val="0"/>
+              </a:spcBef>
+              <a:spcAft>
+                <a:spcPts val="0"/>
+              </a:spcAft>
+              <a:buSzPts val="2000"/>
+              <a:buChar char="○"/>
+            </a:pPr>
+            <a:r>
+              <a:rPr lang="en" sz="2000"/>
+              <a:t>Checked the shape and types of the attributes for each column; Exploratory Data Analysis</a:t>
+            </a:r>
+            <a:endParaRPr sz="2000"/>
+          </a:p>
+          <a:p>
+            <a:pPr indent="-355600" lvl="1" marL="914400" rtl="0" algn="l">
+              <a:spcBef>
+                <a:spcPts val="0"/>
+              </a:spcBef>
+              <a:spcAft>
+                <a:spcPts val="0"/>
+              </a:spcAft>
+              <a:buSzPts val="2000"/>
+              <a:buChar char="○"/>
+            </a:pPr>
+            <a:r>
+              <a:rPr lang="en" sz="2000"/>
+              <a:t>Visualized the relationship between the columns using correlation plots, sns scatterplots, and identifying any patterns </a:t>
             </a:r>
             <a:endParaRPr sz="2000"/>
           </a:p>
@@ -6842,7 +7088,7 @@
             </a:pPr>
             <a:r>
               <a:rPr lang="en"/>
-              <a:t>Data</a:t>
+              <a:t>CRISP-DM</a:t>
             </a:r>
             <a:endParaRPr/>
           </a:p>
@@ -6867,6 +7113,371 @@
         </p:spPr>
         <p:txBody>
           <a:bodyPr anchorCtr="0" anchor="t" bIns="91425" lIns="91425" spcFirstLastPara="1" rIns="91425" wrap="square" tIns="91425">
+            <a:noAutofit/>
+          </a:bodyPr>
+          <a:lstStyle/>
+          <a:p>
+            <a:pPr indent="-355600" lvl="0" marL="457200" rtl="0" algn="l">
+              <a:spcBef>
+                <a:spcPts val="0"/>
+              </a:spcBef>
+              <a:spcAft>
+                <a:spcPts val="0"/>
+              </a:spcAft>
+              <a:buSzPts val="2000"/>
+              <a:buChar char="●"/>
+            </a:pPr>
+            <a:r>
+              <a:rPr lang="en" sz="2000"/>
+              <a:t>Data Preparation </a:t>
+            </a:r>
+            <a:endParaRPr sz="2000"/>
+          </a:p>
+          <a:p>
+            <a:pPr indent="-355600" lvl="1" marL="914400" rtl="0" algn="l">
+              <a:spcBef>
+                <a:spcPts val="0"/>
+              </a:spcBef>
+              <a:spcAft>
+                <a:spcPts val="0"/>
+              </a:spcAft>
+              <a:buSzPts val="2000"/>
+              <a:buChar char="○"/>
+            </a:pPr>
+            <a:r>
+              <a:rPr lang="en" sz="2000"/>
+              <a:t>Checked &amp; removed null values after scraping, removed duplicate values, removed any punctuation </a:t>
+            </a:r>
+            <a:endParaRPr sz="2000"/>
+          </a:p>
+          <a:p>
+            <a:pPr indent="-355600" lvl="1" marL="914400" rtl="0" algn="l">
+              <a:spcBef>
+                <a:spcPts val="0"/>
+              </a:spcBef>
+              <a:spcAft>
+                <a:spcPts val="0"/>
+              </a:spcAft>
+              <a:buSzPts val="2000"/>
+              <a:buChar char="○"/>
+            </a:pPr>
+            <a:r>
+              <a:rPr lang="en" sz="2000"/>
+              <a:t>Feature extraction: Deprecation score and the original price from the current price of the used car</a:t>
+            </a:r>
+            <a:endParaRPr sz="2000"/>
+          </a:p>
+          <a:p>
+            <a:pPr indent="-355600" lvl="0" marL="457200" rtl="0" algn="l">
+              <a:spcBef>
+                <a:spcPts val="0"/>
+              </a:spcBef>
+              <a:spcAft>
+                <a:spcPts val="0"/>
+              </a:spcAft>
+              <a:buSzPts val="2000"/>
+              <a:buChar char="●"/>
+            </a:pPr>
+            <a:r>
+              <a:rPr lang="en" sz="2000"/>
+              <a:t>Modeling</a:t>
+            </a:r>
+            <a:endParaRPr sz="2000"/>
+          </a:p>
+          <a:p>
+            <a:pPr indent="-355600" lvl="1" marL="914400" rtl="0" algn="l">
+              <a:spcBef>
+                <a:spcPts val="0"/>
+              </a:spcBef>
+              <a:spcAft>
+                <a:spcPts val="0"/>
+              </a:spcAft>
+              <a:buSzPts val="2000"/>
+              <a:buChar char="○"/>
+            </a:pPr>
+            <a:r>
+              <a:rPr lang="en" sz="2000"/>
+              <a:t>KMeans Clustering was used to find the golden clusters</a:t>
+            </a:r>
+            <a:endParaRPr sz="2000"/>
+          </a:p>
+          <a:p>
+            <a:pPr indent="-355600" lvl="1" marL="914400" rtl="0" algn="l">
+              <a:spcBef>
+                <a:spcPts val="0"/>
+              </a:spcBef>
+              <a:spcAft>
+                <a:spcPts val="0"/>
+              </a:spcAft>
+              <a:buSzPts val="2000"/>
+              <a:buChar char="○"/>
+            </a:pPr>
+            <a:r>
+              <a:rPr lang="en" sz="2000"/>
+              <a:t>Main Regression Model used include: Linear Regression, MLPRegressor, RandomForestRegressor, KNNRegressor, XBoost Regressor</a:t>
+            </a:r>
+            <a:endParaRPr sz="2000"/>
+          </a:p>
+        </p:txBody>
+      </p:sp>
+    </p:spTree>
+  </p:cSld>
+  <p:clrMapOvr>
+    <a:masterClrMapping/>
+  </p:clrMapOvr>
+</p:sld>
+</file>
+
+<file path=ppt/slides/slide4.xml><?xml version="1.0" encoding="utf-8"?>
+<p:sld xmlns:a="http://schemas.openxmlformats.org/drawingml/2006/main" xmlns:r="http://schemas.openxmlformats.org/officeDocument/2006/relationships" xmlns:mc="http://schemas.openxmlformats.org/markup-compatibility/2006" xmlns:mv="urn:schemas-microsoft-com:mac:vml" xmlns:p="http://schemas.openxmlformats.org/presentationml/2006/main" xmlns:c="http://schemas.openxmlformats.org/drawingml/2006/chart" xmlns:dgm="http://schemas.openxmlformats.org/drawingml/2006/diagram" xmlns:o="urn:schemas-microsoft-com:office:office" xmlns:v="urn:schemas-microsoft-com:vml" xmlns:pvml="urn:schemas-microsoft-com:office:powerpoint" xmlns:com="http://schemas.openxmlformats.org/drawingml/2006/compatibility" xmlns:p14="http://schemas.microsoft.com/office/powerpoint/2010/main" xmlns:p15="http://schemas.microsoft.com/office/powerpoint/2012/main" xmlns:ahyp="http://schemas.microsoft.com/office/drawing/2018/hyperlinkcolor">
+  <p:cSld>
+    <p:spTree>
+      <p:nvGrpSpPr>
+        <p:cNvPr id="76" name="Shape 76"/>
+        <p:cNvGrpSpPr/>
+        <p:nvPr/>
+      </p:nvGrpSpPr>
+      <p:grpSpPr>
+        <a:xfrm>
+          <a:off x="0" y="0"/>
+          <a:ext cx="0" cy="0"/>
+          <a:chOff x="0" y="0"/>
+          <a:chExt cx="0" cy="0"/>
+        </a:xfrm>
+      </p:grpSpPr>
+      <p:sp>
+        <p:nvSpPr>
+          <p:cNvPr id="77" name="Google Shape;77;p16"/>
+          <p:cNvSpPr txBox="1"/>
+          <p:nvPr>
+            <p:ph type="title"/>
+          </p:nvPr>
+        </p:nvSpPr>
+        <p:spPr>
+          <a:xfrm>
+            <a:off x="311700" y="445025"/>
+            <a:ext cx="8520600" cy="572700"/>
+          </a:xfrm>
+          <a:prstGeom prst="rect">
+            <a:avLst/>
+          </a:prstGeom>
+        </p:spPr>
+        <p:txBody>
+          <a:bodyPr anchorCtr="0" anchor="t" bIns="91425" lIns="91425" spcFirstLastPara="1" rIns="91425" wrap="square" tIns="91425">
+            <a:normAutofit fontScale="90000"/>
+          </a:bodyPr>
+          <a:lstStyle/>
+          <a:p>
+            <a:pPr indent="0" lvl="0" marL="0" rtl="0" algn="l">
+              <a:spcBef>
+                <a:spcPts val="0"/>
+              </a:spcBef>
+              <a:spcAft>
+                <a:spcPts val="0"/>
+              </a:spcAft>
+              <a:buNone/>
+            </a:pPr>
+            <a:r>
+              <a:rPr lang="en"/>
+              <a:t>CRISP-DM</a:t>
+            </a:r>
+            <a:endParaRPr/>
+          </a:p>
+        </p:txBody>
+      </p:sp>
+      <p:sp>
+        <p:nvSpPr>
+          <p:cNvPr id="78" name="Google Shape;78;p16"/>
+          <p:cNvSpPr txBox="1"/>
+          <p:nvPr>
+            <p:ph idx="1" type="body"/>
+          </p:nvPr>
+        </p:nvSpPr>
+        <p:spPr>
+          <a:xfrm>
+            <a:off x="311700" y="1152475"/>
+            <a:ext cx="8520600" cy="3416400"/>
+          </a:xfrm>
+          <a:prstGeom prst="rect">
+            <a:avLst/>
+          </a:prstGeom>
+        </p:spPr>
+        <p:txBody>
+          <a:bodyPr anchorCtr="0" anchor="t" bIns="91425" lIns="91425" spcFirstLastPara="1" rIns="91425" wrap="square" tIns="91425">
+            <a:noAutofit/>
+          </a:bodyPr>
+          <a:lstStyle/>
+          <a:p>
+            <a:pPr indent="-355600" lvl="0" marL="457200" rtl="0" algn="l">
+              <a:spcBef>
+                <a:spcPts val="0"/>
+              </a:spcBef>
+              <a:spcAft>
+                <a:spcPts val="0"/>
+              </a:spcAft>
+              <a:buSzPts val="2000"/>
+              <a:buChar char="●"/>
+            </a:pPr>
+            <a:r>
+              <a:rPr lang="en" sz="2000"/>
+              <a:t>Evaluation</a:t>
+            </a:r>
+            <a:endParaRPr sz="2000"/>
+          </a:p>
+          <a:p>
+            <a:pPr indent="-355600" lvl="1" marL="914400" rtl="0" algn="l">
+              <a:spcBef>
+                <a:spcPts val="0"/>
+              </a:spcBef>
+              <a:spcAft>
+                <a:spcPts val="0"/>
+              </a:spcAft>
+              <a:buSzPts val="2000"/>
+              <a:buChar char="○"/>
+            </a:pPr>
+            <a:r>
+              <a:rPr lang="en" sz="2000"/>
+              <a:t>Each model was evaluated for its R2 score and accuracy score</a:t>
+            </a:r>
+            <a:endParaRPr sz="2000"/>
+          </a:p>
+          <a:p>
+            <a:pPr indent="-355600" lvl="1" marL="914400" rtl="0" algn="l">
+              <a:spcBef>
+                <a:spcPts val="0"/>
+              </a:spcBef>
+              <a:spcAft>
+                <a:spcPts val="0"/>
+              </a:spcAft>
+              <a:buSzPts val="2000"/>
+              <a:buChar char="○"/>
+            </a:pPr>
+            <a:r>
+              <a:rPr lang="en" sz="2000"/>
+              <a:t>The RandomForestRegressor was then pickled from the results for deployment purposes</a:t>
+            </a:r>
+            <a:endParaRPr sz="2000"/>
+          </a:p>
+          <a:p>
+            <a:pPr indent="-355600" lvl="0" marL="457200" rtl="0" algn="l">
+              <a:spcBef>
+                <a:spcPts val="0"/>
+              </a:spcBef>
+              <a:spcAft>
+                <a:spcPts val="0"/>
+              </a:spcAft>
+              <a:buSzPts val="2000"/>
+              <a:buChar char="●"/>
+            </a:pPr>
+            <a:r>
+              <a:rPr lang="en" sz="2000"/>
+              <a:t>Deployment</a:t>
+            </a:r>
+            <a:endParaRPr sz="2000"/>
+          </a:p>
+          <a:p>
+            <a:pPr indent="-355600" lvl="1" marL="914400" rtl="0" algn="l">
+              <a:spcBef>
+                <a:spcPts val="0"/>
+              </a:spcBef>
+              <a:spcAft>
+                <a:spcPts val="0"/>
+              </a:spcAft>
+              <a:buSzPts val="2000"/>
+              <a:buChar char="○"/>
+            </a:pPr>
+            <a:r>
+              <a:rPr lang="en" sz="2000"/>
+              <a:t>Pickled RandomForestRegressor model and scores were used to deploy on a website in Heroku using Flask API that takes in user data and executes the prediction algorithm based on pickled data</a:t>
+            </a:r>
+            <a:endParaRPr sz="2000"/>
+          </a:p>
+        </p:txBody>
+      </p:sp>
+    </p:spTree>
+  </p:cSld>
+  <p:clrMapOvr>
+    <a:masterClrMapping/>
+  </p:clrMapOvr>
+</p:sld>
+</file>
+
+<file path=ppt/slides/slide5.xml><?xml version="1.0" encoding="utf-8"?>
+<p:sld xmlns:a="http://schemas.openxmlformats.org/drawingml/2006/main" xmlns:r="http://schemas.openxmlformats.org/officeDocument/2006/relationships" xmlns:mc="http://schemas.openxmlformats.org/markup-compatibility/2006" xmlns:mv="urn:schemas-microsoft-com:mac:vml" xmlns:p="http://schemas.openxmlformats.org/presentationml/2006/main" xmlns:c="http://schemas.openxmlformats.org/drawingml/2006/chart" xmlns:dgm="http://schemas.openxmlformats.org/drawingml/2006/diagram" xmlns:o="urn:schemas-microsoft-com:office:office" xmlns:v="urn:schemas-microsoft-com:vml" xmlns:pvml="urn:schemas-microsoft-com:office:powerpoint" xmlns:com="http://schemas.openxmlformats.org/drawingml/2006/compatibility" xmlns:p14="http://schemas.microsoft.com/office/powerpoint/2010/main" xmlns:p15="http://schemas.microsoft.com/office/powerpoint/2012/main" xmlns:ahyp="http://schemas.microsoft.com/office/drawing/2018/hyperlinkcolor">
+  <p:cSld>
+    <p:spTree>
+      <p:nvGrpSpPr>
+        <p:cNvPr id="82" name="Shape 82"/>
+        <p:cNvGrpSpPr/>
+        <p:nvPr/>
+      </p:nvGrpSpPr>
+      <p:grpSpPr>
+        <a:xfrm>
+          <a:off x="0" y="0"/>
+          <a:ext cx="0" cy="0"/>
+          <a:chOff x="0" y="0"/>
+          <a:chExt cx="0" cy="0"/>
+        </a:xfrm>
+      </p:grpSpPr>
+      <p:sp>
+        <p:nvSpPr>
+          <p:cNvPr id="83" name="Google Shape;83;p17"/>
+          <p:cNvSpPr txBox="1"/>
+          <p:nvPr>
+            <p:ph type="title"/>
+          </p:nvPr>
+        </p:nvSpPr>
+        <p:spPr>
+          <a:xfrm>
+            <a:off x="311700" y="445025"/>
+            <a:ext cx="8520600" cy="572700"/>
+          </a:xfrm>
+          <a:prstGeom prst="rect">
+            <a:avLst/>
+          </a:prstGeom>
+        </p:spPr>
+        <p:txBody>
+          <a:bodyPr anchorCtr="0" anchor="t" bIns="91425" lIns="91425" spcFirstLastPara="1" rIns="91425" wrap="square" tIns="91425">
+            <a:normAutofit fontScale="90000"/>
+          </a:bodyPr>
+          <a:lstStyle/>
+          <a:p>
+            <a:pPr indent="0" lvl="0" marL="0" rtl="0" algn="l">
+              <a:spcBef>
+                <a:spcPts val="0"/>
+              </a:spcBef>
+              <a:spcAft>
+                <a:spcPts val="0"/>
+              </a:spcAft>
+              <a:buNone/>
+            </a:pPr>
+            <a:r>
+              <a:rPr lang="en"/>
+              <a:t>Data</a:t>
+            </a:r>
+            <a:endParaRPr/>
+          </a:p>
+        </p:txBody>
+      </p:sp>
+      <p:sp>
+        <p:nvSpPr>
+          <p:cNvPr id="84" name="Google Shape;84;p17"/>
+          <p:cNvSpPr txBox="1"/>
+          <p:nvPr>
+            <p:ph idx="1" type="body"/>
+          </p:nvPr>
+        </p:nvSpPr>
+        <p:spPr>
+          <a:xfrm>
+            <a:off x="311700" y="1152475"/>
+            <a:ext cx="8520600" cy="3416400"/>
+          </a:xfrm>
+          <a:prstGeom prst="rect">
+            <a:avLst/>
+          </a:prstGeom>
+        </p:spPr>
+        <p:txBody>
+          <a:bodyPr anchorCtr="0" anchor="t" bIns="91425" lIns="91425" spcFirstLastPara="1" rIns="91425" wrap="square" tIns="91425">
             <a:normAutofit/>
           </a:bodyPr>
           <a:lstStyle/>
@@ -6914,7 +7525,7 @@
       </p:sp>
       <p:pic>
         <p:nvPicPr>
-          <p:cNvPr id="73" name="Google Shape;73;p15"/>
+          <p:cNvPr id="85" name="Google Shape;85;p17"/>
           <p:cNvPicPr preferRelativeResize="0"/>
           <p:nvPr/>
         </p:nvPicPr>
@@ -6948,12 +7559,12 @@
 </p:sld>
 </file>
 
-<file path=ppt/slides/slide4.xml><?xml version="1.0" encoding="utf-8"?>
+<file path=ppt/slides/slide6.xml><?xml version="1.0" encoding="utf-8"?>
 <p:sld xmlns:a="http://schemas.openxmlformats.org/drawingml/2006/main" xmlns:r="http://schemas.openxmlformats.org/officeDocument/2006/relationships" xmlns:mc="http://schemas.openxmlformats.org/markup-compatibility/2006" xmlns:mv="urn:schemas-microsoft-com:mac:vml" xmlns:p="http://schemas.openxmlformats.org/presentationml/2006/main" xmlns:c="http://schemas.openxmlformats.org/drawingml/2006/chart" xmlns:dgm="http://schemas.openxmlformats.org/drawingml/2006/diagram" xmlns:o="urn:schemas-microsoft-com:office:office" xmlns:v="urn:schemas-microsoft-com:vml" xmlns:pvml="urn:schemas-microsoft-com:office:powerpoint" xmlns:com="http://schemas.openxmlformats.org/drawingml/2006/compatibility" xmlns:p14="http://schemas.microsoft.com/office/powerpoint/2010/main" xmlns:p15="http://schemas.microsoft.com/office/powerpoint/2012/main" xmlns:ahyp="http://schemas.microsoft.com/office/drawing/2018/hyperlinkcolor">
   <p:cSld>
     <p:spTree>
       <p:nvGrpSpPr>
-        <p:cNvPr id="77" name="Shape 77"/>
+        <p:cNvPr id="89" name="Shape 89"/>
         <p:cNvGrpSpPr/>
         <p:nvPr/>
       </p:nvGrpSpPr>
@@ -6967,7 +7578,7 @@
       </p:grpSpPr>
       <p:sp>
         <p:nvSpPr>
-          <p:cNvPr id="78" name="Google Shape;78;p16"/>
+          <p:cNvPr id="90" name="Google Shape;90;p18"/>
           <p:cNvSpPr txBox="1"/>
           <p:nvPr>
             <p:ph type="title"/>
@@ -7007,7 +7618,7 @@
       </p:sp>
       <p:sp>
         <p:nvSpPr>
-          <p:cNvPr id="79" name="Google Shape;79;p16"/>
+          <p:cNvPr id="91" name="Google Shape;91;p18"/>
           <p:cNvSpPr txBox="1"/>
           <p:nvPr>
             <p:ph idx="1" type="body"/>
@@ -7169,7 +7780,7 @@
       </p:sp>
       <p:pic>
         <p:nvPicPr>
-          <p:cNvPr id="80" name="Google Shape;80;p16"/>
+          <p:cNvPr id="92" name="Google Shape;92;p18"/>
           <p:cNvPicPr preferRelativeResize="0"/>
           <p:nvPr/>
         </p:nvPicPr>
@@ -7202,12 +7813,12 @@
 </p:sld>
 </file>
 
-<file path=ppt/slides/slide5.xml><?xml version="1.0" encoding="utf-8"?>
+<file path=ppt/slides/slide7.xml><?xml version="1.0" encoding="utf-8"?>
 <p:sld xmlns:a="http://schemas.openxmlformats.org/drawingml/2006/main" xmlns:r="http://schemas.openxmlformats.org/officeDocument/2006/relationships" xmlns:mc="http://schemas.openxmlformats.org/markup-compatibility/2006" xmlns:mv="urn:schemas-microsoft-com:mac:vml" xmlns:p="http://schemas.openxmlformats.org/presentationml/2006/main" xmlns:c="http://schemas.openxmlformats.org/drawingml/2006/chart" xmlns:dgm="http://schemas.openxmlformats.org/drawingml/2006/diagram" xmlns:o="urn:schemas-microsoft-com:office:office" xmlns:v="urn:schemas-microsoft-com:vml" xmlns:pvml="urn:schemas-microsoft-com:office:powerpoint" xmlns:com="http://schemas.openxmlformats.org/drawingml/2006/compatibility" xmlns:p14="http://schemas.microsoft.com/office/powerpoint/2010/main" xmlns:p15="http://schemas.microsoft.com/office/powerpoint/2012/main" xmlns:ahyp="http://schemas.microsoft.com/office/drawing/2018/hyperlinkcolor">
   <p:cSld>
     <p:spTree>
       <p:nvGrpSpPr>
-        <p:cNvPr id="84" name="Shape 84"/>
+        <p:cNvPr id="96" name="Shape 96"/>
         <p:cNvGrpSpPr/>
         <p:nvPr/>
       </p:nvGrpSpPr>
@@ -7221,7 +7832,7 @@
       </p:grpSpPr>
       <p:sp>
         <p:nvSpPr>
-          <p:cNvPr id="85" name="Google Shape;85;p17"/>
+          <p:cNvPr id="97" name="Google Shape;97;p19"/>
           <p:cNvSpPr txBox="1"/>
           <p:nvPr>
             <p:ph type="title"/>
@@ -7261,7 +7872,7 @@
       </p:sp>
       <p:pic>
         <p:nvPicPr>
-          <p:cNvPr id="86" name="Google Shape;86;p17"/>
+          <p:cNvPr id="98" name="Google Shape;98;p19"/>
           <p:cNvPicPr preferRelativeResize="0"/>
           <p:nvPr/>
         </p:nvPicPr>
@@ -7289,7 +7900,7 @@
       </p:pic>
       <p:pic>
         <p:nvPicPr>
-          <p:cNvPr id="87" name="Google Shape;87;p17"/>
+          <p:cNvPr id="99" name="Google Shape;99;p19"/>
           <p:cNvPicPr preferRelativeResize="0"/>
           <p:nvPr/>
         </p:nvPicPr>
@@ -7323,12 +7934,12 @@
 </p:sld>
 </file>
 
-<file path=ppt/slides/slide6.xml><?xml version="1.0" encoding="utf-8"?>
+<file path=ppt/slides/slide8.xml><?xml version="1.0" encoding="utf-8"?>
 <p:sld xmlns:a="http://schemas.openxmlformats.org/drawingml/2006/main" xmlns:r="http://schemas.openxmlformats.org/officeDocument/2006/relationships" xmlns:mc="http://schemas.openxmlformats.org/markup-compatibility/2006" xmlns:mv="urn:schemas-microsoft-com:mac:vml" xmlns:p="http://schemas.openxmlformats.org/presentationml/2006/main" xmlns:c="http://schemas.openxmlformats.org/drawingml/2006/chart" xmlns:dgm="http://schemas.openxmlformats.org/drawingml/2006/diagram" xmlns:o="urn:schemas-microsoft-com:office:office" xmlns:v="urn:schemas-microsoft-com:vml" xmlns:pvml="urn:schemas-microsoft-com:office:powerpoint" xmlns:com="http://schemas.openxmlformats.org/drawingml/2006/compatibility" xmlns:p14="http://schemas.microsoft.com/office/powerpoint/2010/main" xmlns:p15="http://schemas.microsoft.com/office/powerpoint/2012/main" xmlns:ahyp="http://schemas.microsoft.com/office/drawing/2018/hyperlinkcolor">
   <p:cSld>
     <p:spTree>
       <p:nvGrpSpPr>
-        <p:cNvPr id="91" name="Shape 91"/>
+        <p:cNvPr id="103" name="Shape 103"/>
         <p:cNvGrpSpPr/>
         <p:nvPr/>
       </p:nvGrpSpPr>
@@ -7342,7 +7953,7 @@
       </p:grpSpPr>
       <p:sp>
         <p:nvSpPr>
-          <p:cNvPr id="92" name="Google Shape;92;p18"/>
+          <p:cNvPr id="104" name="Google Shape;104;p20"/>
           <p:cNvSpPr txBox="1"/>
           <p:nvPr>
             <p:ph type="title"/>
@@ -7382,7 +7993,7 @@
       </p:sp>
       <p:pic>
         <p:nvPicPr>
-          <p:cNvPr id="93" name="Google Shape;93;p18"/>
+          <p:cNvPr id="105" name="Google Shape;105;p20"/>
           <p:cNvPicPr preferRelativeResize="0"/>
           <p:nvPr/>
         </p:nvPicPr>

</xml_diff>